<commit_message>
Add choose api key
</commit_message>
<xml_diff>
--- a/PptxToVideo/bin/Debug/net8.0-windows/ПрезентаціяПривіт/press.pptx
+++ b/PptxToVideo/bin/Debug/net8.0-windows/ПрезентаціяПривіт/press.pptx
@@ -1,6 +1,6 @@
 
 <file path=ppt/presentation.xml><?xml version="1.0" encoding="utf-8"?>
-<p:presentation xmlns:a="http://schemas.openxmlformats.org/drawingml/2006/main" xmlns:r="http://schemas.openxmlformats.org/officeDocument/2006/relationships" xmlns:p="http://schemas.openxmlformats.org/presentationml/2006/main" saveSubsetFonts="1">
+<p:presentation xmlns:a="http://schemas.openxmlformats.org/drawingml/2006/main" xmlns:r="http://schemas.openxmlformats.org/officeDocument/2006/relationships" xmlns:p="http://schemas.openxmlformats.org/presentationml/2006/main" embedTrueTypeFonts="1" saveSubsetFonts="1">
   <p:sldMasterIdLst>
     <p:sldMasterId id="2147483648" r:id="rId1"/>
   </p:sldMasterIdLst>
@@ -263,7 +263,7 @@
           <a:p>
             <a:fld id="{99F0086E-63FC-4A37-A7EA-65D59121E348}" type="datetimeFigureOut">
               <a:rPr lang="uk-UA" smtClean="0"/>
-              <a:t>10.08.2024</a:t>
+              <a:t>01.12.2024</a:t>
             </a:fld>
             <a:endParaRPr lang="uk-UA"/>
           </a:p>
@@ -463,7 +463,7 @@
           <a:p>
             <a:fld id="{99F0086E-63FC-4A37-A7EA-65D59121E348}" type="datetimeFigureOut">
               <a:rPr lang="uk-UA" smtClean="0"/>
-              <a:t>10.08.2024</a:t>
+              <a:t>01.12.2024</a:t>
             </a:fld>
             <a:endParaRPr lang="uk-UA"/>
           </a:p>
@@ -673,7 +673,7 @@
           <a:p>
             <a:fld id="{99F0086E-63FC-4A37-A7EA-65D59121E348}" type="datetimeFigureOut">
               <a:rPr lang="uk-UA" smtClean="0"/>
-              <a:t>10.08.2024</a:t>
+              <a:t>01.12.2024</a:t>
             </a:fld>
             <a:endParaRPr lang="uk-UA"/>
           </a:p>
@@ -873,7 +873,7 @@
           <a:p>
             <a:fld id="{99F0086E-63FC-4A37-A7EA-65D59121E348}" type="datetimeFigureOut">
               <a:rPr lang="uk-UA" smtClean="0"/>
-              <a:t>10.08.2024</a:t>
+              <a:t>01.12.2024</a:t>
             </a:fld>
             <a:endParaRPr lang="uk-UA"/>
           </a:p>
@@ -1149,7 +1149,7 @@
           <a:p>
             <a:fld id="{99F0086E-63FC-4A37-A7EA-65D59121E348}" type="datetimeFigureOut">
               <a:rPr lang="uk-UA" smtClean="0"/>
-              <a:t>10.08.2024</a:t>
+              <a:t>01.12.2024</a:t>
             </a:fld>
             <a:endParaRPr lang="uk-UA"/>
           </a:p>
@@ -1417,7 +1417,7 @@
           <a:p>
             <a:fld id="{99F0086E-63FC-4A37-A7EA-65D59121E348}" type="datetimeFigureOut">
               <a:rPr lang="uk-UA" smtClean="0"/>
-              <a:t>10.08.2024</a:t>
+              <a:t>01.12.2024</a:t>
             </a:fld>
             <a:endParaRPr lang="uk-UA"/>
           </a:p>
@@ -1832,7 +1832,7 @@
           <a:p>
             <a:fld id="{99F0086E-63FC-4A37-A7EA-65D59121E348}" type="datetimeFigureOut">
               <a:rPr lang="uk-UA" smtClean="0"/>
-              <a:t>10.08.2024</a:t>
+              <a:t>01.12.2024</a:t>
             </a:fld>
             <a:endParaRPr lang="uk-UA"/>
           </a:p>
@@ -1974,7 +1974,7 @@
           <a:p>
             <a:fld id="{99F0086E-63FC-4A37-A7EA-65D59121E348}" type="datetimeFigureOut">
               <a:rPr lang="uk-UA" smtClean="0"/>
-              <a:t>10.08.2024</a:t>
+              <a:t>01.12.2024</a:t>
             </a:fld>
             <a:endParaRPr lang="uk-UA"/>
           </a:p>
@@ -2087,7 +2087,7 @@
           <a:p>
             <a:fld id="{99F0086E-63FC-4A37-A7EA-65D59121E348}" type="datetimeFigureOut">
               <a:rPr lang="uk-UA" smtClean="0"/>
-              <a:t>10.08.2024</a:t>
+              <a:t>01.12.2024</a:t>
             </a:fld>
             <a:endParaRPr lang="uk-UA"/>
           </a:p>
@@ -2400,7 +2400,7 @@
           <a:p>
             <a:fld id="{99F0086E-63FC-4A37-A7EA-65D59121E348}" type="datetimeFigureOut">
               <a:rPr lang="uk-UA" smtClean="0"/>
-              <a:t>10.08.2024</a:t>
+              <a:t>01.12.2024</a:t>
             </a:fld>
             <a:endParaRPr lang="uk-UA"/>
           </a:p>
@@ -2689,7 +2689,7 @@
           <a:p>
             <a:fld id="{99F0086E-63FC-4A37-A7EA-65D59121E348}" type="datetimeFigureOut">
               <a:rPr lang="uk-UA" smtClean="0"/>
-              <a:t>10.08.2024</a:t>
+              <a:t>01.12.2024</a:t>
             </a:fld>
             <a:endParaRPr lang="uk-UA"/>
           </a:p>
@@ -2932,7 +2932,7 @@
           <a:p>
             <a:fld id="{99F0086E-63FC-4A37-A7EA-65D59121E348}" type="datetimeFigureOut">
               <a:rPr lang="uk-UA" smtClean="0"/>
-              <a:t>10.08.2024</a:t>
+              <a:t>01.12.2024</a:t>
             </a:fld>
             <a:endParaRPr lang="uk-UA"/>
           </a:p>
@@ -3411,7 +3411,7 @@
             <a:hlinkClick r:id="" action="ppaction://media"/>
             <a:extLst>
               <a:ext uri="{FF2B5EF4-FFF2-40B4-BE49-F238E27FC236}">
-                <a16:creationId xmlns:a16="http://schemas.microsoft.com/office/drawing/2014/main" id="{F5D0847E-60C5-D2DC-B5C4-EA08EEF4CFED}"/>
+                <a16:creationId xmlns:a16="http://schemas.microsoft.com/office/drawing/2014/main" id="{75F2701A-A1CD-A347-E528-38A52B25D86C}"/>
               </a:ext>
             </a:extLst>
           </p:cNvPr>
@@ -3489,7 +3489,7 @@
                                   <p:childTnLst>
                                     <p:cmd type="call" cmd="playFrom(0.0)">
                                       <p:cBhvr>
-                                        <p:cTn id="6" dur="4257" fill="hold"/>
+                                        <p:cTn id="6" dur="4179" fill="hold"/>
                                         <p:tgtEl>
                                           <p:spTgt spid="4"/>
                                         </p:tgtEl>
@@ -3627,7 +3627,7 @@
             <a:hlinkClick r:id="" action="ppaction://media"/>
             <a:extLst>
               <a:ext uri="{FF2B5EF4-FFF2-40B4-BE49-F238E27FC236}">
-                <a16:creationId xmlns:a16="http://schemas.microsoft.com/office/drawing/2014/main" id="{4AB487FF-3476-215C-C7A1-EBF8ADD6284D}"/>
+                <a16:creationId xmlns:a16="http://schemas.microsoft.com/office/drawing/2014/main" id="{FA2D5ED9-BB58-AD65-C3D6-5EB8542B342F}"/>
               </a:ext>
             </a:extLst>
           </p:cNvPr>
@@ -3705,7 +3705,7 @@
                                   <p:childTnLst>
                                     <p:cmd type="call" cmd="playFrom(0.0)">
                                       <p:cBhvr>
-                                        <p:cTn id="6" dur="2742" fill="hold"/>
+                                        <p:cTn id="6" dur="2638" fill="hold"/>
                                         <p:tgtEl>
                                           <p:spTgt spid="4"/>
                                         </p:tgtEl>
@@ -3843,7 +3843,7 @@
             <a:hlinkClick r:id="" action="ppaction://media"/>
             <a:extLst>
               <a:ext uri="{FF2B5EF4-FFF2-40B4-BE49-F238E27FC236}">
-                <a16:creationId xmlns:a16="http://schemas.microsoft.com/office/drawing/2014/main" id="{6F99407A-DEB6-C55E-B165-65BBD89A7F2D}"/>
+                <a16:creationId xmlns:a16="http://schemas.microsoft.com/office/drawing/2014/main" id="{C3B8C62D-6EC1-F22F-7472-558882C04EC2}"/>
               </a:ext>
             </a:extLst>
           </p:cNvPr>
@@ -3921,7 +3921,7 @@
                                   <p:childTnLst>
                                     <p:cmd type="call" cmd="playFrom(0.0)">
                                       <p:cBhvr>
-                                        <p:cTn id="6" dur="3056" fill="hold"/>
+                                        <p:cTn id="6" dur="3291" fill="hold"/>
                                         <p:tgtEl>
                                           <p:spTgt spid="4"/>
                                         </p:tgtEl>

</xml_diff>